<commit_message>
ui and functionality polish
</commit_message>
<xml_diff>
--- a/icon.pptx
+++ b/icon.pptx
@@ -8,6 +8,7 @@
     <p:sldId id="256" r:id="rId2"/>
     <p:sldId id="257" r:id="rId3"/>
     <p:sldId id="258" r:id="rId4"/>
+    <p:sldId id="259" r:id="rId5"/>
   </p:sldIdLst>
   <p:sldSz cx="12192000" cy="6858000"/>
   <p:notesSz cx="6858000" cy="9144000"/>
@@ -261,7 +262,7 @@
           <a:p>
             <a:fld id="{AE4074BC-D934-4947-8698-1F51D40D8EE8}" type="datetimeFigureOut">
               <a:rPr lang="en-US" smtClean="0"/>
-              <a:t>11/13/2019</a:t>
+              <a:t>12/1/2019</a:t>
             </a:fld>
             <a:endParaRPr lang="en-US"/>
           </a:p>
@@ -459,7 +460,7 @@
           <a:p>
             <a:fld id="{AE4074BC-D934-4947-8698-1F51D40D8EE8}" type="datetimeFigureOut">
               <a:rPr lang="en-US" smtClean="0"/>
-              <a:t>11/13/2019</a:t>
+              <a:t>12/1/2019</a:t>
             </a:fld>
             <a:endParaRPr lang="en-US"/>
           </a:p>
@@ -667,7 +668,7 @@
           <a:p>
             <a:fld id="{AE4074BC-D934-4947-8698-1F51D40D8EE8}" type="datetimeFigureOut">
               <a:rPr lang="en-US" smtClean="0"/>
-              <a:t>11/13/2019</a:t>
+              <a:t>12/1/2019</a:t>
             </a:fld>
             <a:endParaRPr lang="en-US"/>
           </a:p>
@@ -865,7 +866,7 @@
           <a:p>
             <a:fld id="{AE4074BC-D934-4947-8698-1F51D40D8EE8}" type="datetimeFigureOut">
               <a:rPr lang="en-US" smtClean="0"/>
-              <a:t>11/13/2019</a:t>
+              <a:t>12/1/2019</a:t>
             </a:fld>
             <a:endParaRPr lang="en-US"/>
           </a:p>
@@ -1140,7 +1141,7 @@
           <a:p>
             <a:fld id="{AE4074BC-D934-4947-8698-1F51D40D8EE8}" type="datetimeFigureOut">
               <a:rPr lang="en-US" smtClean="0"/>
-              <a:t>11/13/2019</a:t>
+              <a:t>12/1/2019</a:t>
             </a:fld>
             <a:endParaRPr lang="en-US"/>
           </a:p>
@@ -1405,7 +1406,7 @@
           <a:p>
             <a:fld id="{AE4074BC-D934-4947-8698-1F51D40D8EE8}" type="datetimeFigureOut">
               <a:rPr lang="en-US" smtClean="0"/>
-              <a:t>11/13/2019</a:t>
+              <a:t>12/1/2019</a:t>
             </a:fld>
             <a:endParaRPr lang="en-US"/>
           </a:p>
@@ -1817,7 +1818,7 @@
           <a:p>
             <a:fld id="{AE4074BC-D934-4947-8698-1F51D40D8EE8}" type="datetimeFigureOut">
               <a:rPr lang="en-US" smtClean="0"/>
-              <a:t>11/13/2019</a:t>
+              <a:t>12/1/2019</a:t>
             </a:fld>
             <a:endParaRPr lang="en-US"/>
           </a:p>
@@ -1958,7 +1959,7 @@
           <a:p>
             <a:fld id="{AE4074BC-D934-4947-8698-1F51D40D8EE8}" type="datetimeFigureOut">
               <a:rPr lang="en-US" smtClean="0"/>
-              <a:t>11/13/2019</a:t>
+              <a:t>12/1/2019</a:t>
             </a:fld>
             <a:endParaRPr lang="en-US"/>
           </a:p>
@@ -2071,7 +2072,7 @@
           <a:p>
             <a:fld id="{AE4074BC-D934-4947-8698-1F51D40D8EE8}" type="datetimeFigureOut">
               <a:rPr lang="en-US" smtClean="0"/>
-              <a:t>11/13/2019</a:t>
+              <a:t>12/1/2019</a:t>
             </a:fld>
             <a:endParaRPr lang="en-US"/>
           </a:p>
@@ -2382,7 +2383,7 @@
           <a:p>
             <a:fld id="{AE4074BC-D934-4947-8698-1F51D40D8EE8}" type="datetimeFigureOut">
               <a:rPr lang="en-US" smtClean="0"/>
-              <a:t>11/13/2019</a:t>
+              <a:t>12/1/2019</a:t>
             </a:fld>
             <a:endParaRPr lang="en-US"/>
           </a:p>
@@ -2670,7 +2671,7 @@
           <a:p>
             <a:fld id="{AE4074BC-D934-4947-8698-1F51D40D8EE8}" type="datetimeFigureOut">
               <a:rPr lang="en-US" smtClean="0"/>
-              <a:t>11/13/2019</a:t>
+              <a:t>12/1/2019</a:t>
             </a:fld>
             <a:endParaRPr lang="en-US"/>
           </a:p>
@@ -2911,7 +2912,7 @@
           <a:p>
             <a:fld id="{AE4074BC-D934-4947-8698-1F51D40D8EE8}" type="datetimeFigureOut">
               <a:rPr lang="en-US" smtClean="0"/>
-              <a:t>11/13/2019</a:t>
+              <a:t>12/1/2019</a:t>
             </a:fld>
             <a:endParaRPr lang="en-US"/>
           </a:p>
@@ -3328,12 +3329,58 @@
           <a:chExt cx="0" cy="0"/>
         </a:xfrm>
       </p:grpSpPr>
+      <p:sp>
+        <p:nvSpPr>
+          <p:cNvPr id="3" name="Rectangle 2">
+            <a:extLst>
+              <a:ext uri="{FF2B5EF4-FFF2-40B4-BE49-F238E27FC236}">
+                <a16:creationId xmlns:a16="http://schemas.microsoft.com/office/drawing/2014/main" id="{44BE0B17-1F99-4A80-9153-A84C2A520E23}"/>
+              </a:ext>
+            </a:extLst>
+          </p:cNvPr>
+          <p:cNvSpPr/>
+          <p:nvPr/>
+        </p:nvSpPr>
+        <p:spPr>
+          <a:xfrm>
+            <a:off x="4805082" y="1631576"/>
+            <a:ext cx="5163671" cy="4222377"/>
+          </a:xfrm>
+          <a:prstGeom prst="rect">
+            <a:avLst/>
+          </a:prstGeom>
+        </p:spPr>
+        <p:style>
+          <a:lnRef idx="2">
+            <a:schemeClr val="accent1">
+              <a:shade val="50000"/>
+            </a:schemeClr>
+          </a:lnRef>
+          <a:fillRef idx="1">
+            <a:schemeClr val="accent1"/>
+          </a:fillRef>
+          <a:effectRef idx="0">
+            <a:schemeClr val="accent1"/>
+          </a:effectRef>
+          <a:fontRef idx="minor">
+            <a:schemeClr val="lt1"/>
+          </a:fontRef>
+        </p:style>
+        <p:txBody>
+          <a:bodyPr rtlCol="0" anchor="ctr"/>
+          <a:lstStyle/>
+          <a:p>
+            <a:pPr algn="ctr"/>
+            <a:endParaRPr lang="en-US"/>
+          </a:p>
+        </p:txBody>
+      </p:sp>
       <p:grpSp>
         <p:nvGrpSpPr>
-          <p:cNvPr id="29" name="Group 28">
-            <a:extLst>
-              <a:ext uri="{FF2B5EF4-FFF2-40B4-BE49-F238E27FC236}">
-                <a16:creationId xmlns:a16="http://schemas.microsoft.com/office/drawing/2014/main" id="{13854433-1E1F-4425-8177-58C9D234CB27}"/>
+          <p:cNvPr id="16" name="Group 15">
+            <a:extLst>
+              <a:ext uri="{FF2B5EF4-FFF2-40B4-BE49-F238E27FC236}">
+                <a16:creationId xmlns:a16="http://schemas.microsoft.com/office/drawing/2014/main" id="{5126F131-E7BE-4054-A5E8-9EC62029A9D2}"/>
               </a:ext>
             </a:extLst>
           </p:cNvPr>
@@ -3350,10 +3397,10 @@
         </p:grpSpPr>
         <p:sp>
           <p:nvSpPr>
-            <p:cNvPr id="4" name="Rectangle: Rounded Corners 3">
+            <p:cNvPr id="17" name="Rectangle: Rounded Corners 16">
               <a:extLst>
                 <a:ext uri="{FF2B5EF4-FFF2-40B4-BE49-F238E27FC236}">
-                  <a16:creationId xmlns:a16="http://schemas.microsoft.com/office/drawing/2014/main" id="{6DAC6382-1991-43EF-B128-A53538CC0045}"/>
+                  <a16:creationId xmlns:a16="http://schemas.microsoft.com/office/drawing/2014/main" id="{CBEE16E9-DB54-4964-AA84-960FDEE81835}"/>
                 </a:ext>
               </a:extLst>
             </p:cNvPr>
@@ -3402,10 +3449,10 @@
         </p:sp>
         <p:sp>
           <p:nvSpPr>
-            <p:cNvPr id="5" name="Rectangle: Rounded Corners 4">
+            <p:cNvPr id="18" name="Rectangle: Rounded Corners 17">
               <a:extLst>
                 <a:ext uri="{FF2B5EF4-FFF2-40B4-BE49-F238E27FC236}">
-                  <a16:creationId xmlns:a16="http://schemas.microsoft.com/office/drawing/2014/main" id="{F075F43F-2373-4FAA-B417-F449CCD3CEA1}"/>
+                  <a16:creationId xmlns:a16="http://schemas.microsoft.com/office/drawing/2014/main" id="{140AC60C-82DC-4913-AB0F-CA896A922C39}"/>
                 </a:ext>
               </a:extLst>
             </p:cNvPr>
@@ -3456,10 +3503,10 @@
         </p:sp>
         <p:sp>
           <p:nvSpPr>
-            <p:cNvPr id="6" name="Rectangle: Rounded Corners 5">
+            <p:cNvPr id="19" name="Rectangle: Rounded Corners 18">
               <a:extLst>
                 <a:ext uri="{FF2B5EF4-FFF2-40B4-BE49-F238E27FC236}">
-                  <a16:creationId xmlns:a16="http://schemas.microsoft.com/office/drawing/2014/main" id="{8ADDF7ED-8EAC-4127-AFDC-A63DA8BD4DA9}"/>
+                  <a16:creationId xmlns:a16="http://schemas.microsoft.com/office/drawing/2014/main" id="{AC33F777-D1A4-4313-810C-BA47B2B604BD}"/>
                 </a:ext>
               </a:extLst>
             </p:cNvPr>
@@ -3510,10 +3557,10 @@
         </p:sp>
         <p:sp>
           <p:nvSpPr>
-            <p:cNvPr id="7" name="Rectangle: Rounded Corners 6">
+            <p:cNvPr id="20" name="Rectangle: Rounded Corners 19">
               <a:extLst>
                 <a:ext uri="{FF2B5EF4-FFF2-40B4-BE49-F238E27FC236}">
-                  <a16:creationId xmlns:a16="http://schemas.microsoft.com/office/drawing/2014/main" id="{108C2C65-C5B0-4624-BD3C-AA2ABE7D29C1}"/>
+                  <a16:creationId xmlns:a16="http://schemas.microsoft.com/office/drawing/2014/main" id="{BDAAF62E-9EC3-473F-AB40-224A7753AC5F}"/>
                 </a:ext>
               </a:extLst>
             </p:cNvPr>
@@ -3564,10 +3611,10 @@
         </p:sp>
         <p:sp>
           <p:nvSpPr>
-            <p:cNvPr id="11" name="Rectangle: Rounded Corners 10">
+            <p:cNvPr id="21" name="Rectangle: Rounded Corners 20">
               <a:extLst>
                 <a:ext uri="{FF2B5EF4-FFF2-40B4-BE49-F238E27FC236}">
-                  <a16:creationId xmlns:a16="http://schemas.microsoft.com/office/drawing/2014/main" id="{44AF9AE2-BD25-411B-BA26-6E1F51208930}"/>
+                  <a16:creationId xmlns:a16="http://schemas.microsoft.com/office/drawing/2014/main" id="{05923457-6837-4EB1-ABCA-9591DA7FA0C4}"/>
                 </a:ext>
               </a:extLst>
             </p:cNvPr>
@@ -3618,10 +3665,10 @@
         </p:sp>
         <p:sp>
           <p:nvSpPr>
-            <p:cNvPr id="13" name="Rectangle: Rounded Corners 12">
+            <p:cNvPr id="22" name="Rectangle: Rounded Corners 21">
               <a:extLst>
                 <a:ext uri="{FF2B5EF4-FFF2-40B4-BE49-F238E27FC236}">
-                  <a16:creationId xmlns:a16="http://schemas.microsoft.com/office/drawing/2014/main" id="{8704F0B5-42F9-43A1-93A9-AA3AE2AC2C4A}"/>
+                  <a16:creationId xmlns:a16="http://schemas.microsoft.com/office/drawing/2014/main" id="{0360A923-BF1C-4C90-B4DD-B9D0F3908976}"/>
                 </a:ext>
               </a:extLst>
             </p:cNvPr>
@@ -3672,10 +3719,10 @@
         </p:sp>
         <p:sp>
           <p:nvSpPr>
-            <p:cNvPr id="15" name="Rectangle: Rounded Corners 14">
+            <p:cNvPr id="23" name="Rectangle: Rounded Corners 22">
               <a:extLst>
                 <a:ext uri="{FF2B5EF4-FFF2-40B4-BE49-F238E27FC236}">
-                  <a16:creationId xmlns:a16="http://schemas.microsoft.com/office/drawing/2014/main" id="{6A87D7C8-0B2C-4BD0-AE3F-F081A6A74145}"/>
+                  <a16:creationId xmlns:a16="http://schemas.microsoft.com/office/drawing/2014/main" id="{5278DC87-AE34-441C-B94A-523A7C35BFEA}"/>
                 </a:ext>
               </a:extLst>
             </p:cNvPr>
@@ -4698,6 +4745,211 @@
 </p:sld>
 </file>
 
+<file path=ppt/slides/slide4.xml><?xml version="1.0" encoding="utf-8"?>
+<p:sld xmlns:a="http://schemas.openxmlformats.org/drawingml/2006/main" xmlns:r="http://schemas.openxmlformats.org/officeDocument/2006/relationships" xmlns:p="http://schemas.openxmlformats.org/presentationml/2006/main">
+  <p:cSld>
+    <p:spTree>
+      <p:nvGrpSpPr>
+        <p:cNvPr id="1" name=""/>
+        <p:cNvGrpSpPr/>
+        <p:nvPr/>
+      </p:nvGrpSpPr>
+      <p:grpSpPr>
+        <a:xfrm>
+          <a:off x="0" y="0"/>
+          <a:ext cx="0" cy="0"/>
+          <a:chOff x="0" y="0"/>
+          <a:chExt cx="0" cy="0"/>
+        </a:xfrm>
+      </p:grpSpPr>
+      <p:sp>
+        <p:nvSpPr>
+          <p:cNvPr id="7" name="Rectangle 6">
+            <a:extLst>
+              <a:ext uri="{FF2B5EF4-FFF2-40B4-BE49-F238E27FC236}">
+                <a16:creationId xmlns:a16="http://schemas.microsoft.com/office/drawing/2014/main" id="{69862F60-E5FC-43DB-8D08-13EF73792FD6}"/>
+              </a:ext>
+            </a:extLst>
+          </p:cNvPr>
+          <p:cNvSpPr/>
+          <p:nvPr/>
+        </p:nvSpPr>
+        <p:spPr>
+          <a:xfrm>
+            <a:off x="3783106" y="1353671"/>
+            <a:ext cx="3272118" cy="2698376"/>
+          </a:xfrm>
+          <a:prstGeom prst="rect">
+            <a:avLst/>
+          </a:prstGeom>
+        </p:spPr>
+        <p:style>
+          <a:lnRef idx="2">
+            <a:schemeClr val="accent1">
+              <a:shade val="50000"/>
+            </a:schemeClr>
+          </a:lnRef>
+          <a:fillRef idx="1">
+            <a:schemeClr val="accent1"/>
+          </a:fillRef>
+          <a:effectRef idx="0">
+            <a:schemeClr val="accent1"/>
+          </a:effectRef>
+          <a:fontRef idx="minor">
+            <a:schemeClr val="lt1"/>
+          </a:fontRef>
+        </p:style>
+        <p:txBody>
+          <a:bodyPr rtlCol="0" anchor="ctr"/>
+          <a:lstStyle/>
+          <a:p>
+            <a:pPr algn="ctr"/>
+            <a:endParaRPr lang="en-US"/>
+          </a:p>
+        </p:txBody>
+      </p:sp>
+      <p:grpSp>
+        <p:nvGrpSpPr>
+          <p:cNvPr id="8" name="Group 7">
+            <a:extLst>
+              <a:ext uri="{FF2B5EF4-FFF2-40B4-BE49-F238E27FC236}">
+                <a16:creationId xmlns:a16="http://schemas.microsoft.com/office/drawing/2014/main" id="{B778B452-10BF-4589-BCE6-357D8DF0DA8B}"/>
+              </a:ext>
+            </a:extLst>
+          </p:cNvPr>
+          <p:cNvGrpSpPr/>
+          <p:nvPr/>
+        </p:nvGrpSpPr>
+        <p:grpSpPr>
+          <a:xfrm>
+            <a:off x="3944469" y="1721224"/>
+            <a:ext cx="2223247" cy="2223247"/>
+            <a:chOff x="3944469" y="1721224"/>
+            <a:chExt cx="2223247" cy="2223247"/>
+          </a:xfrm>
+        </p:grpSpPr>
+        <p:sp>
+          <p:nvSpPr>
+            <p:cNvPr id="9" name="Rectangle 8">
+              <a:extLst>
+                <a:ext uri="{FF2B5EF4-FFF2-40B4-BE49-F238E27FC236}">
+                  <a16:creationId xmlns:a16="http://schemas.microsoft.com/office/drawing/2014/main" id="{715344BA-16A6-4005-9144-FAD11FF94B0E}"/>
+                </a:ext>
+              </a:extLst>
+            </p:cNvPr>
+            <p:cNvSpPr/>
+            <p:nvPr/>
+          </p:nvSpPr>
+          <p:spPr>
+            <a:xfrm>
+              <a:off x="4849906" y="1721224"/>
+              <a:ext cx="412376" cy="2223247"/>
+            </a:xfrm>
+            <a:prstGeom prst="rect">
+              <a:avLst/>
+            </a:prstGeom>
+            <a:solidFill>
+              <a:schemeClr val="bg1"/>
+            </a:solidFill>
+            <a:ln>
+              <a:solidFill>
+                <a:schemeClr val="bg1"/>
+              </a:solidFill>
+            </a:ln>
+          </p:spPr>
+          <p:style>
+            <a:lnRef idx="2">
+              <a:schemeClr val="accent1">
+                <a:shade val="50000"/>
+              </a:schemeClr>
+            </a:lnRef>
+            <a:fillRef idx="1">
+              <a:schemeClr val="accent1"/>
+            </a:fillRef>
+            <a:effectRef idx="0">
+              <a:schemeClr val="accent1"/>
+            </a:effectRef>
+            <a:fontRef idx="minor">
+              <a:schemeClr val="lt1"/>
+            </a:fontRef>
+          </p:style>
+          <p:txBody>
+            <a:bodyPr rtlCol="0" anchor="ctr"/>
+            <a:lstStyle/>
+            <a:p>
+              <a:pPr algn="ctr"/>
+              <a:endParaRPr lang="en-US"/>
+            </a:p>
+          </p:txBody>
+        </p:sp>
+        <p:sp>
+          <p:nvSpPr>
+            <p:cNvPr id="10" name="Rectangle 9">
+              <a:extLst>
+                <a:ext uri="{FF2B5EF4-FFF2-40B4-BE49-F238E27FC236}">
+                  <a16:creationId xmlns:a16="http://schemas.microsoft.com/office/drawing/2014/main" id="{C83B0F67-7A88-4214-AAD8-D739F3628DC9}"/>
+                </a:ext>
+              </a:extLst>
+            </p:cNvPr>
+            <p:cNvSpPr/>
+            <p:nvPr/>
+          </p:nvSpPr>
+          <p:spPr>
+            <a:xfrm rot="5400000">
+              <a:off x="4849905" y="1667436"/>
+              <a:ext cx="412376" cy="2223247"/>
+            </a:xfrm>
+            <a:prstGeom prst="rect">
+              <a:avLst/>
+            </a:prstGeom>
+            <a:solidFill>
+              <a:schemeClr val="bg1"/>
+            </a:solidFill>
+            <a:ln>
+              <a:solidFill>
+                <a:schemeClr val="bg1"/>
+              </a:solidFill>
+            </a:ln>
+          </p:spPr>
+          <p:style>
+            <a:lnRef idx="2">
+              <a:schemeClr val="accent1">
+                <a:shade val="50000"/>
+              </a:schemeClr>
+            </a:lnRef>
+            <a:fillRef idx="1">
+              <a:schemeClr val="accent1"/>
+            </a:fillRef>
+            <a:effectRef idx="0">
+              <a:schemeClr val="accent1"/>
+            </a:effectRef>
+            <a:fontRef idx="minor">
+              <a:schemeClr val="lt1"/>
+            </a:fontRef>
+          </p:style>
+          <p:txBody>
+            <a:bodyPr rtlCol="0" anchor="ctr"/>
+            <a:lstStyle/>
+            <a:p>
+              <a:pPr algn="ctr"/>
+              <a:endParaRPr lang="en-US"/>
+            </a:p>
+          </p:txBody>
+        </p:sp>
+      </p:grpSp>
+    </p:spTree>
+    <p:extLst>
+      <p:ext uri="{BB962C8B-B14F-4D97-AF65-F5344CB8AC3E}">
+        <p14:creationId xmlns:p14="http://schemas.microsoft.com/office/powerpoint/2010/main" val="2473056667"/>
+      </p:ext>
+    </p:extLst>
+  </p:cSld>
+  <p:clrMapOvr>
+    <a:masterClrMapping/>
+  </p:clrMapOvr>
+</p:sld>
+</file>
+
 <file path=ppt/theme/theme1.xml><?xml version="1.0" encoding="utf-8"?>
 <a:theme xmlns:a="http://schemas.openxmlformats.org/drawingml/2006/main" name="Office Theme">
   <a:themeElements>

</xml_diff>